<commit_message>
Updated presentation with corrections.
</commit_message>
<xml_diff>
--- a/UWG - Code and Load - 20200310.pptx
+++ b/UWG - Code and Load - 20200310.pptx
@@ -126,6 +126,11 @@
       </a:defRPr>
     </a:lvl9pPr>
   </p:defaultTextStyle>
+  <p:extLst>
+    <p:ext uri="{EFAFB233-063F-42B5-8137-9DF3F51BA10A}">
+      <p15:sldGuideLst xmlns:p15="http://schemas.microsoft.com/office/powerpoint/2012/main"/>
+    </p:ext>
+  </p:extLst>
 </p:presentation>
 </file>
 
@@ -276,7 +281,7 @@
           <a:p>
             <a:fld id="{02C663A9-78C1-4F7D-88E7-92B3E7EA79BB}" type="datetimeFigureOut">
               <a:rPr lang="en-US" smtClean="0"/>
-              <a:t>2/7/2020</a:t>
+              <a:t>2/9/2020</a:t>
             </a:fld>
             <a:endParaRPr lang="en-US" dirty="0"/>
           </a:p>
@@ -474,7 +479,7 @@
           <a:p>
             <a:fld id="{02C663A9-78C1-4F7D-88E7-92B3E7EA79BB}" type="datetimeFigureOut">
               <a:rPr lang="en-US" smtClean="0"/>
-              <a:t>2/7/2020</a:t>
+              <a:t>2/9/2020</a:t>
             </a:fld>
             <a:endParaRPr lang="en-US" dirty="0"/>
           </a:p>
@@ -682,7 +687,7 @@
           <a:p>
             <a:fld id="{02C663A9-78C1-4F7D-88E7-92B3E7EA79BB}" type="datetimeFigureOut">
               <a:rPr lang="en-US" smtClean="0"/>
-              <a:t>2/7/2020</a:t>
+              <a:t>2/9/2020</a:t>
             </a:fld>
             <a:endParaRPr lang="en-US" dirty="0"/>
           </a:p>
@@ -880,7 +885,7 @@
           <a:p>
             <a:fld id="{02C663A9-78C1-4F7D-88E7-92B3E7EA79BB}" type="datetimeFigureOut">
               <a:rPr lang="en-US" smtClean="0"/>
-              <a:t>2/7/2020</a:t>
+              <a:t>2/9/2020</a:t>
             </a:fld>
             <a:endParaRPr lang="en-US" dirty="0"/>
           </a:p>
@@ -1155,7 +1160,7 @@
           <a:p>
             <a:fld id="{02C663A9-78C1-4F7D-88E7-92B3E7EA79BB}" type="datetimeFigureOut">
               <a:rPr lang="en-US" smtClean="0"/>
-              <a:t>2/7/2020</a:t>
+              <a:t>2/9/2020</a:t>
             </a:fld>
             <a:endParaRPr lang="en-US" dirty="0"/>
           </a:p>
@@ -1420,7 +1425,7 @@
           <a:p>
             <a:fld id="{02C663A9-78C1-4F7D-88E7-92B3E7EA79BB}" type="datetimeFigureOut">
               <a:rPr lang="en-US" smtClean="0"/>
-              <a:t>2/7/2020</a:t>
+              <a:t>2/9/2020</a:t>
             </a:fld>
             <a:endParaRPr lang="en-US" dirty="0"/>
           </a:p>
@@ -1832,7 +1837,7 @@
           <a:p>
             <a:fld id="{02C663A9-78C1-4F7D-88E7-92B3E7EA79BB}" type="datetimeFigureOut">
               <a:rPr lang="en-US" smtClean="0"/>
-              <a:t>2/7/2020</a:t>
+              <a:t>2/9/2020</a:t>
             </a:fld>
             <a:endParaRPr lang="en-US" dirty="0"/>
           </a:p>
@@ -1973,7 +1978,7 @@
           <a:p>
             <a:fld id="{02C663A9-78C1-4F7D-88E7-92B3E7EA79BB}" type="datetimeFigureOut">
               <a:rPr lang="en-US" smtClean="0"/>
-              <a:t>2/7/2020</a:t>
+              <a:t>2/9/2020</a:t>
             </a:fld>
             <a:endParaRPr lang="en-US" dirty="0"/>
           </a:p>
@@ -2086,7 +2091,7 @@
           <a:p>
             <a:fld id="{02C663A9-78C1-4F7D-88E7-92B3E7EA79BB}" type="datetimeFigureOut">
               <a:rPr lang="en-US" smtClean="0"/>
-              <a:t>2/7/2020</a:t>
+              <a:t>2/9/2020</a:t>
             </a:fld>
             <a:endParaRPr lang="en-US" dirty="0"/>
           </a:p>
@@ -2397,7 +2402,7 @@
           <a:p>
             <a:fld id="{02C663A9-78C1-4F7D-88E7-92B3E7EA79BB}" type="datetimeFigureOut">
               <a:rPr lang="en-US" smtClean="0"/>
-              <a:t>2/7/2020</a:t>
+              <a:t>2/9/2020</a:t>
             </a:fld>
             <a:endParaRPr lang="en-US" dirty="0"/>
           </a:p>
@@ -2685,7 +2690,7 @@
           <a:p>
             <a:fld id="{02C663A9-78C1-4F7D-88E7-92B3E7EA79BB}" type="datetimeFigureOut">
               <a:rPr lang="en-US" smtClean="0"/>
-              <a:t>2/7/2020</a:t>
+              <a:t>2/9/2020</a:t>
             </a:fld>
             <a:endParaRPr lang="en-US" dirty="0"/>
           </a:p>
@@ -2926,7 +2931,7 @@
           <a:p>
             <a:fld id="{02C663A9-78C1-4F7D-88E7-92B3E7EA79BB}" type="datetimeFigureOut">
               <a:rPr lang="en-US" smtClean="0"/>
-              <a:t>2/7/2020</a:t>
+              <a:t>2/9/2020</a:t>
             </a:fld>
             <a:endParaRPr lang="en-US" dirty="0"/>
           </a:p>
@@ -4939,6 +4944,12 @@
               <a:t> and remove the @* *@ comments around the heading Recent Events</a:t>
             </a:r>
           </a:p>
+          <a:p>
+            <a:r>
+              <a:rPr lang="en-US" dirty="0"/>
+              <a:t>Save All (Ctrl-Shift-A) and Debug (F5)</a:t>
+            </a:r>
+          </a:p>
         </p:txBody>
       </p:sp>
     </p:spTree>
@@ -5505,6 +5516,16 @@
             </a:r>
           </a:p>
           <a:p>
+            <a:r>
+              <a:rPr lang="en-US" dirty="0"/>
+              <a:t>Save All (Ctrl-Shift-A) and Debug (F5)</a:t>
+            </a:r>
+          </a:p>
+          <a:p>
+            <a:pPr lvl="1"/>
+            <a:endParaRPr lang="en-US" dirty="0"/>
+          </a:p>
+          <a:p>
             <a:pPr lvl="1"/>
             <a:endParaRPr lang="en-US" dirty="0"/>
           </a:p>
@@ -5846,7 +5867,7 @@
         <p:spPr/>
         <p:txBody>
           <a:bodyPr>
-            <a:normAutofit lnSpcReduction="10000"/>
+            <a:normAutofit fontScale="92500" lnSpcReduction="10000"/>
           </a:bodyPr>
           <a:lstStyle/>
           <a:p>
@@ -6076,6 +6097,12 @@
             <a:r>
               <a:rPr lang="en-US" dirty="0"/>
               <a:t>Click Update</a:t>
+            </a:r>
+          </a:p>
+          <a:p>
+            <a:r>
+              <a:rPr lang="en-US" dirty="0"/>
+              <a:t>Save All (Ctrl-Shift-A) and Debug (F5)</a:t>
             </a:r>
           </a:p>
         </p:txBody>
@@ -7236,6 +7263,12 @@
           <a:p>
             <a:r>
               <a:rPr lang="en-US" dirty="0"/>
+              <a:t>Double-Click Bloodhound.sln</a:t>
+            </a:r>
+          </a:p>
+          <a:p>
+            <a:r>
+              <a:rPr lang="en-US" dirty="0"/>
               <a:t>Start Debugging (F5)</a:t>
             </a:r>
           </a:p>
@@ -7634,7 +7667,7 @@
         <p:spPr/>
         <p:txBody>
           <a:bodyPr>
-            <a:normAutofit/>
+            <a:normAutofit lnSpcReduction="10000"/>
           </a:bodyPr>
           <a:lstStyle/>
           <a:p>
@@ -7646,7 +7679,23 @@
           <a:p>
             <a:r>
               <a:rPr lang="en-US" sz="2400" dirty="0"/>
-              <a:t>Complete the functionality in AddNewLocation(OffenderLocation)</a:t>
+              <a:t>Complete the functionality in </a:t>
+            </a:r>
+            <a:r>
+              <a:rPr lang="en-US" sz="2400" dirty="0" err="1"/>
+              <a:t>AddNewLocation</a:t>
+            </a:r>
+            <a:r>
+              <a:rPr lang="en-US" sz="2400" dirty="0"/>
+              <a:t>(decimal, decimal, </a:t>
+            </a:r>
+            <a:r>
+              <a:rPr lang="en-US" sz="2400" dirty="0" err="1"/>
+              <a:t>DateTimeOffset</a:t>
+            </a:r>
+            <a:r>
+              <a:rPr lang="en-US" sz="2400" dirty="0"/>
+              <a:t>)</a:t>
             </a:r>
           </a:p>
           <a:p>
@@ -7680,13 +7729,36 @@
           <a:p>
             <a:r>
               <a:rPr lang="en-US" sz="2400" dirty="0"/>
-              <a:t>Use the OffenderGeoFence.IsInside(OffenderLocation) method to determine if the a location is inside the fence or not</a:t>
-            </a:r>
-          </a:p>
-          <a:p>
+              <a:t>Use the </a:t>
+            </a:r>
+            <a:r>
+              <a:rPr lang="en-US" sz="2400" dirty="0" err="1"/>
+              <a:t>OffenderGeoFence.IsInside</a:t>
+            </a:r>
             <a:r>
               <a:rPr lang="en-US" sz="2400" dirty="0"/>
-              <a:t>Once complete, run all unit tests.</a:t>
+              <a:t>(decimal</a:t>
+            </a:r>
+            <a:r>
+              <a:rPr lang="en-US" sz="2400"/>
+              <a:t>, decimal) </a:t>
+            </a:r>
+            <a:r>
+              <a:rPr lang="en-US" sz="2400" dirty="0"/>
+              <a:t>method to determine if the a location is inside the fence or not</a:t>
+            </a:r>
+          </a:p>
+          <a:p>
+            <a:r>
+              <a:rPr lang="en-US" sz="2400" dirty="0"/>
+              <a:t>Once complete, Save All, run all unit tests.</a:t>
+            </a:r>
+          </a:p>
+          <a:p>
+            <a:pPr lvl="1"/>
+            <a:r>
+              <a:rPr lang="en-US" sz="2000" dirty="0"/>
+              <a:t>File &gt; Save All (Ctrl-Shift-S)</a:t>
             </a:r>
           </a:p>
           <a:p>

</xml_diff>